<commit_message>
* adding some more key-features and a title-slide
</commit_message>
<xml_diff>
--- a/doc/task01/first_analysis.pptx
+++ b/doc/task01/first_analysis.pptx
@@ -5,9 +5,10 @@
     <p:sldMasterId id="2147483648" r:id="rId1"/>
   </p:sldMasterIdLst>
   <p:sldIdLst>
-    <p:sldId id="257" r:id="rId2"/>
-    <p:sldId id="258" r:id="rId3"/>
-    <p:sldId id="259" r:id="rId4"/>
+    <p:sldId id="260" r:id="rId2"/>
+    <p:sldId id="257" r:id="rId3"/>
+    <p:sldId id="258" r:id="rId4"/>
+    <p:sldId id="259" r:id="rId5"/>
   </p:sldIdLst>
   <p:sldSz cx="12192000" cy="6858000"/>
   <p:notesSz cx="6858000" cy="9144000"/>
@@ -106,6 +107,11 @@
       </a:defRPr>
     </a:lvl9pPr>
   </p:defaultTextStyle>
+  <p:extLst>
+    <p:ext uri="{EFAFB233-063F-42B5-8137-9DF3F51BA10A}">
+      <p15:sldGuideLst xmlns:p15="http://schemas.microsoft.com/office/powerpoint/2012/main"/>
+    </p:ext>
+  </p:extLst>
 </p:presentation>
 </file>
 
@@ -2973,7 +2979,32 @@
             <a:spLocks noGrp="1"/>
           </p:cNvSpPr>
           <p:nvPr>
-            <p:ph type="title"/>
+            <p:ph type="ctrTitle"/>
+          </p:nvPr>
+        </p:nvSpPr>
+        <p:spPr/>
+        <p:txBody>
+          <a:bodyPr>
+            <a:normAutofit/>
+          </a:bodyPr>
+          <a:lstStyle/>
+          <a:p>
+            <a:r>
+              <a:rPr lang="en-US" sz="4000" dirty="0" smtClean="0"/>
+              <a:t>CS Task 1 (first analysis) – MHC - PMS</a:t>
+            </a:r>
+            <a:endParaRPr lang="en-US" sz="4000" dirty="0"/>
+          </a:p>
+        </p:txBody>
+      </p:sp>
+      <p:sp>
+        <p:nvSpPr>
+          <p:cNvPr id="3" name="Subtitle 2"/>
+          <p:cNvSpPr>
+            <a:spLocks noGrp="1"/>
+          </p:cNvSpPr>
+          <p:nvPr>
+            <p:ph type="subTitle" idx="1"/>
           </p:nvPr>
         </p:nvSpPr>
         <p:spPr/>
@@ -2983,42 +3014,15 @@
           <a:p>
             <a:r>
               <a:rPr lang="en-US" dirty="0" smtClean="0"/>
-              <a:t>CS Task 1: First Analysis | Target User</a:t>
-            </a:r>
-            <a:endParaRPr lang="en-US" dirty="0"/>
-          </a:p>
-        </p:txBody>
-      </p:sp>
-      <p:sp>
-        <p:nvSpPr>
-          <p:cNvPr id="3" name="Content Placeholder 2"/>
-          <p:cNvSpPr>
-            <a:spLocks noGrp="1"/>
-          </p:cNvSpPr>
-          <p:nvPr>
-            <p:ph idx="1"/>
-          </p:nvPr>
-        </p:nvSpPr>
-        <p:spPr/>
-        <p:txBody>
-          <a:bodyPr/>
-          <a:lstStyle/>
-          <a:p>
+              <a:t>Team white</a:t>
+            </a:r>
+            <a:r>
+              <a:rPr lang="en-US" sz="2800" dirty="0" smtClean="0"/>
+              <a:t> |</a:t>
+            </a:r>
             <a:r>
               <a:rPr lang="en-US" dirty="0" smtClean="0"/>
-              <a:t>Medical staff (Doctors, nurses, health visitors)</a:t>
-            </a:r>
-          </a:p>
-          <a:p>
-            <a:r>
-              <a:rPr lang="en-US" dirty="0" smtClean="0"/>
-              <a:t>Receptionists</a:t>
-            </a:r>
-          </a:p>
-          <a:p>
-            <a:r>
-              <a:rPr lang="en-US" dirty="0" smtClean="0"/>
-              <a:t>Medical records staff</a:t>
+              <a:t> 03.02.2016 </a:t>
             </a:r>
             <a:endParaRPr lang="en-US" dirty="0"/>
           </a:p>
@@ -3027,7 +3031,7 @@
     </p:spTree>
     <p:extLst>
       <p:ext uri="{BB962C8B-B14F-4D97-AF65-F5344CB8AC3E}">
-        <p14:creationId xmlns:p14="http://schemas.microsoft.com/office/powerpoint/2010/main" val="2244724816"/>
+        <p14:creationId xmlns:p14="http://schemas.microsoft.com/office/powerpoint/2010/main" val="1724043234"/>
       </p:ext>
     </p:extLst>
   </p:cSld>
@@ -3078,7 +3082,7 @@
           <a:p>
             <a:r>
               <a:rPr lang="en-US" dirty="0" smtClean="0"/>
-              <a:t>CS Task 1: First Analysis | Key features</a:t>
+              <a:t>CS Task 1: First Analysis | Target User</a:t>
             </a:r>
             <a:endParaRPr lang="en-US" dirty="0"/>
           </a:p>
@@ -3101,62 +3105,20 @@
           <a:p>
             <a:r>
               <a:rPr lang="en-US" dirty="0" smtClean="0"/>
-              <a:t>Data recording</a:t>
-            </a:r>
-          </a:p>
-          <a:p>
-            <a:pPr lvl="1"/>
+              <a:t>Medical staff (Doctors, nurses, health visitors)</a:t>
+            </a:r>
+          </a:p>
+          <a:p>
             <a:r>
               <a:rPr lang="en-US" dirty="0" smtClean="0"/>
-              <a:t>Health/Treatment history &amp; current state</a:t>
-            </a:r>
-          </a:p>
-          <a:p>
-            <a:pPr lvl="1"/>
+              <a:t>Receptionists</a:t>
+            </a:r>
+          </a:p>
+          <a:p>
             <a:r>
               <a:rPr lang="en-US" dirty="0" smtClean="0"/>
-              <a:t>Appointments </a:t>
-            </a:r>
-          </a:p>
-          <a:p>
-            <a:pPr lvl="1"/>
-            <a:r>
-              <a:rPr lang="en-US" dirty="0" smtClean="0"/>
-              <a:t>Prescriptions</a:t>
-            </a:r>
-          </a:p>
-          <a:p>
-            <a:pPr lvl="1"/>
-            <a:r>
-              <a:rPr lang="en-US" dirty="0" smtClean="0"/>
-              <a:t>General information (Address, Classification)</a:t>
-            </a:r>
-          </a:p>
-          <a:p>
-            <a:r>
-              <a:rPr lang="en-US" dirty="0" smtClean="0"/>
-              <a:t>Reporting</a:t>
-            </a:r>
-          </a:p>
-          <a:p>
-            <a:pPr lvl="1"/>
-            <a:r>
-              <a:rPr lang="en-US" dirty="0" smtClean="0"/>
-              <a:t>Management reports (Statistical/Financial) </a:t>
-            </a:r>
-          </a:p>
-          <a:p>
-            <a:r>
-              <a:rPr lang="en-US" dirty="0" smtClean="0"/>
-              <a:t>Anonymization/Access control (legislation)</a:t>
-            </a:r>
-          </a:p>
-          <a:p>
-            <a:pPr lvl="1"/>
-            <a:endParaRPr lang="en-US" dirty="0" smtClean="0"/>
-          </a:p>
-          <a:p>
-            <a:pPr lvl="1"/>
+              <a:t>Medical records staff</a:t>
+            </a:r>
             <a:endParaRPr lang="en-US" dirty="0"/>
           </a:p>
         </p:txBody>
@@ -3164,7 +3126,7 @@
     </p:spTree>
     <p:extLst>
       <p:ext uri="{BB962C8B-B14F-4D97-AF65-F5344CB8AC3E}">
-        <p14:creationId xmlns:p14="http://schemas.microsoft.com/office/powerpoint/2010/main" val="438856884"/>
+        <p14:creationId xmlns:p14="http://schemas.microsoft.com/office/powerpoint/2010/main" val="2244724816"/>
       </p:ext>
     </p:extLst>
   </p:cSld>
@@ -3215,6 +3177,154 @@
           <a:p>
             <a:r>
               <a:rPr lang="en-US" dirty="0" smtClean="0"/>
+              <a:t>CS Task 1: First Analysis | Key features</a:t>
+            </a:r>
+            <a:endParaRPr lang="en-US" dirty="0"/>
+          </a:p>
+        </p:txBody>
+      </p:sp>
+      <p:sp>
+        <p:nvSpPr>
+          <p:cNvPr id="3" name="Content Placeholder 2"/>
+          <p:cNvSpPr>
+            <a:spLocks noGrp="1"/>
+          </p:cNvSpPr>
+          <p:nvPr>
+            <p:ph idx="1"/>
+          </p:nvPr>
+        </p:nvSpPr>
+        <p:spPr/>
+        <p:txBody>
+          <a:bodyPr/>
+          <a:lstStyle/>
+          <a:p>
+            <a:r>
+              <a:rPr lang="en-US" dirty="0" smtClean="0"/>
+              <a:t>Data recording</a:t>
+            </a:r>
+          </a:p>
+          <a:p>
+            <a:pPr lvl="1"/>
+            <a:r>
+              <a:rPr lang="en-US" dirty="0" smtClean="0"/>
+              <a:t>Health/Treatment history &amp; current state</a:t>
+            </a:r>
+          </a:p>
+          <a:p>
+            <a:pPr lvl="1"/>
+            <a:r>
+              <a:rPr lang="en-US" dirty="0" smtClean="0"/>
+              <a:t>Appointments </a:t>
+            </a:r>
+          </a:p>
+          <a:p>
+            <a:pPr lvl="1"/>
+            <a:r>
+              <a:rPr lang="en-US" dirty="0" smtClean="0"/>
+              <a:t>Prescriptions</a:t>
+            </a:r>
+          </a:p>
+          <a:p>
+            <a:pPr lvl="1"/>
+            <a:r>
+              <a:rPr lang="en-US" dirty="0" smtClean="0"/>
+              <a:t>General information (Address, Classification)</a:t>
+            </a:r>
+          </a:p>
+          <a:p>
+            <a:r>
+              <a:rPr lang="en-US" dirty="0" smtClean="0"/>
+              <a:t>Reporting</a:t>
+            </a:r>
+          </a:p>
+          <a:p>
+            <a:pPr lvl="1"/>
+            <a:r>
+              <a:rPr lang="en-US" dirty="0" smtClean="0"/>
+              <a:t>Management reports (Statistical/Financial) </a:t>
+            </a:r>
+          </a:p>
+          <a:p>
+            <a:r>
+              <a:rPr lang="en-US" dirty="0" smtClean="0"/>
+              <a:t>Anonymization/Access control (legislation</a:t>
+            </a:r>
+            <a:r>
+              <a:rPr lang="en-US" dirty="0" smtClean="0"/>
+              <a:t>)</a:t>
+            </a:r>
+          </a:p>
+          <a:p>
+            <a:r>
+              <a:rPr lang="en-US" dirty="0" smtClean="0"/>
+              <a:t>Accessible from multiple locations</a:t>
+            </a:r>
+            <a:endParaRPr lang="en-US" dirty="0" smtClean="0"/>
+          </a:p>
+          <a:p>
+            <a:pPr lvl="1"/>
+            <a:endParaRPr lang="en-US" dirty="0" smtClean="0"/>
+          </a:p>
+          <a:p>
+            <a:pPr lvl="1"/>
+            <a:endParaRPr lang="en-US" dirty="0"/>
+          </a:p>
+        </p:txBody>
+      </p:sp>
+    </p:spTree>
+    <p:extLst>
+      <p:ext uri="{BB962C8B-B14F-4D97-AF65-F5344CB8AC3E}">
+        <p14:creationId xmlns:p14="http://schemas.microsoft.com/office/powerpoint/2010/main" val="438856884"/>
+      </p:ext>
+    </p:extLst>
+  </p:cSld>
+  <p:clrMapOvr>
+    <a:masterClrMapping/>
+  </p:clrMapOvr>
+  <p:timing>
+    <p:tnLst>
+      <p:par>
+        <p:cTn id="1" dur="indefinite" restart="never" nodeType="tmRoot"/>
+      </p:par>
+    </p:tnLst>
+  </p:timing>
+</p:sld>
+</file>
+
+<file path=ppt/slides/slide4.xml><?xml version="1.0" encoding="utf-8"?>
+<p:sld xmlns:a="http://schemas.openxmlformats.org/drawingml/2006/main" xmlns:r="http://schemas.openxmlformats.org/officeDocument/2006/relationships" xmlns:p="http://schemas.openxmlformats.org/presentationml/2006/main">
+  <p:cSld>
+    <p:spTree>
+      <p:nvGrpSpPr>
+        <p:cNvPr id="1" name=""/>
+        <p:cNvGrpSpPr/>
+        <p:nvPr/>
+      </p:nvGrpSpPr>
+      <p:grpSpPr>
+        <a:xfrm>
+          <a:off x="0" y="0"/>
+          <a:ext cx="0" cy="0"/>
+          <a:chOff x="0" y="0"/>
+          <a:chExt cx="0" cy="0"/>
+        </a:xfrm>
+      </p:grpSpPr>
+      <p:sp>
+        <p:nvSpPr>
+          <p:cNvPr id="2" name="Title 1"/>
+          <p:cNvSpPr>
+            <a:spLocks noGrp="1"/>
+          </p:cNvSpPr>
+          <p:nvPr>
+            <p:ph type="title"/>
+          </p:nvPr>
+        </p:nvSpPr>
+        <p:spPr/>
+        <p:txBody>
+          <a:bodyPr/>
+          <a:lstStyle/>
+          <a:p>
+            <a:r>
+              <a:rPr lang="en-US" dirty="0" smtClean="0"/>
               <a:t>CS Task 1: First Analysis | CSF</a:t>
             </a:r>
             <a:endParaRPr lang="en-US" dirty="0"/>
@@ -3244,13 +3354,8 @@
           <a:p>
             <a:r>
               <a:rPr lang="en-US" dirty="0" smtClean="0"/>
-              <a:t>Retain a good relationship </a:t>
-            </a:r>
-            <a:r>
-              <a:rPr lang="en-US" smtClean="0"/>
-              <a:t>with client</a:t>
-            </a:r>
-            <a:endParaRPr lang="en-US" dirty="0" smtClean="0"/>
+              <a:t>Retain a good relationship with client</a:t>
+            </a:r>
           </a:p>
           <a:p>
             <a:r>

</xml_diff>